<commit_message>
Updated the PDF versions of the lectures
</commit_message>
<xml_diff>
--- a/lectures/Lect07_Optim.pptx
+++ b/lectures/Lect07_Optim.pptx
@@ -265,7 +265,7 @@
           <a:p>
             <a:fld id="{B7D6DDD3-D7E9-488B-B626-1E8285E424D8}" type="datetimeFigureOut">
               <a:rPr lang="en-US" smtClean="0"/>
-              <a:t>2/26/2019</a:t>
+              <a:t>9/28/2020</a:t>
             </a:fld>
             <a:endParaRPr lang="en-US"/>
           </a:p>
@@ -7632,13 +7632,7 @@
                           <a:rPr lang="en-US" i="1">
                             <a:latin typeface="Cambria Math" panose="02040503050406030204" pitchFamily="18" charset="0"/>
                           </a:rPr>
-                          <m:t>=</m:t>
-                        </m:r>
-                        <m:r>
-                          <a:rPr lang="en-US" i="1">
-                            <a:latin typeface="Cambria Math" panose="02040503050406030204" pitchFamily="18" charset="0"/>
-                          </a:rPr>
-                          <m:t>1</m:t>
+                          <m:t>=1</m:t>
                         </m:r>
                       </m:sub>
                       <m:sup>
@@ -8017,13 +8011,7 @@
                             <a:rPr lang="en-US" i="1">
                               <a:latin typeface="Cambria Math" panose="02040503050406030204" pitchFamily="18" charset="0"/>
                             </a:rPr>
-                            <m:t>=</m:t>
-                          </m:r>
-                          <m:r>
-                            <a:rPr lang="en-US" i="1">
-                              <a:latin typeface="Cambria Math" panose="02040503050406030204" pitchFamily="18" charset="0"/>
-                            </a:rPr>
-                            <m:t>1</m:t>
+                            <m:t>=1</m:t>
                           </m:r>
                         </m:sub>
                         <m:sup>
@@ -8303,13 +8291,7 @@
                             <a:rPr lang="en-US" i="1">
                               <a:latin typeface="Cambria Math" panose="02040503050406030204" pitchFamily="18" charset="0"/>
                             </a:rPr>
-                            <m:t>=</m:t>
-                          </m:r>
-                          <m:r>
-                            <a:rPr lang="en-US" i="1">
-                              <a:latin typeface="Cambria Math" panose="02040503050406030204" pitchFamily="18" charset="0"/>
-                            </a:rPr>
-                            <m:t>1</m:t>
+                            <m:t>=1</m:t>
                           </m:r>
                         </m:sub>
                         <m:sup>
@@ -8695,8 +8677,8 @@
           </a:p>
         </p:txBody>
       </p:sp>
-      <mc:AlternateContent xmlns:mc="http://schemas.openxmlformats.org/markup-compatibility/2006">
-        <mc:Choice xmlns:a14="http://schemas.microsoft.com/office/drawing/2010/main" Requires="a14">
+      <mc:AlternateContent xmlns:mc="http://schemas.openxmlformats.org/markup-compatibility/2006" xmlns:a14="http://schemas.microsoft.com/office/drawing/2010/main">
+        <mc:Choice Requires="a14">
           <p:sp>
             <p:nvSpPr>
               <p:cNvPr id="3" name="Content Placeholder 2">
@@ -9138,7 +9120,7 @@
                 <a:pPr lvl="1"/>
                 <a:r>
                   <a:rPr lang="en-US" dirty="0"/>
-                  <a:t>There is an summation index </a:t>
+                  <a:t>There is a summation index </a:t>
                 </a:r>
                 <a14:m>
                   <m:oMath xmlns:m="http://schemas.openxmlformats.org/officeDocument/2006/math">
@@ -9393,7 +9375,7 @@
             </p:txBody>
           </p:sp>
         </mc:Choice>
-        <mc:Fallback>
+        <mc:Fallback xmlns="">
           <p:sp>
             <p:nvSpPr>
               <p:cNvPr id="3" name="Content Placeholder 2">
@@ -9520,8 +9502,8 @@
           </a:p>
         </p:txBody>
       </p:sp>
-      <mc:AlternateContent xmlns:mc="http://schemas.openxmlformats.org/markup-compatibility/2006">
-        <mc:Choice xmlns:a14="http://schemas.microsoft.com/office/drawing/2010/main" Requires="a14">
+      <mc:AlternateContent xmlns:mc="http://schemas.openxmlformats.org/markup-compatibility/2006" xmlns:a14="http://schemas.microsoft.com/office/drawing/2010/main">
+        <mc:Choice Requires="a14">
           <p:sp>
             <p:nvSpPr>
               <p:cNvPr id="3" name="Content Placeholder 2">
@@ -11036,7 +11018,7 @@
             </p:txBody>
           </p:sp>
         </mc:Choice>
-        <mc:Fallback>
+        <mc:Fallback xmlns="">
           <p:sp>
             <p:nvSpPr>
               <p:cNvPr id="3" name="Content Placeholder 2">
@@ -11163,8 +11145,8 @@
           </a:p>
         </p:txBody>
       </p:sp>
-      <mc:AlternateContent xmlns:mc="http://schemas.openxmlformats.org/markup-compatibility/2006">
-        <mc:Choice xmlns:a14="http://schemas.microsoft.com/office/drawing/2010/main" Requires="a14">
+      <mc:AlternateContent xmlns:mc="http://schemas.openxmlformats.org/markup-compatibility/2006" xmlns:a14="http://schemas.microsoft.com/office/drawing/2010/main">
+        <mc:Choice Requires="a14">
           <p:sp>
             <p:nvSpPr>
               <p:cNvPr id="3" name="Content Placeholder 2">
@@ -12145,7 +12127,7 @@
             </p:txBody>
           </p:sp>
         </mc:Choice>
-        <mc:Fallback>
+        <mc:Fallback xmlns="">
           <p:sp>
             <p:nvSpPr>
               <p:cNvPr id="3" name="Content Placeholder 2">
@@ -12453,8 +12435,8 @@
           </a:fontRef>
         </p:style>
       </p:cxnSp>
-      <mc:AlternateContent xmlns:mc="http://schemas.openxmlformats.org/markup-compatibility/2006">
-        <mc:Choice xmlns:a14="http://schemas.microsoft.com/office/drawing/2010/main" Requires="a14">
+      <mc:AlternateContent xmlns:mc="http://schemas.openxmlformats.org/markup-compatibility/2006" xmlns:a14="http://schemas.microsoft.com/office/drawing/2010/main">
+        <mc:Choice Requires="a14">
           <p:sp>
             <p:nvSpPr>
               <p:cNvPr id="13" name="TextBox 12">
@@ -12483,6 +12465,7 @@
               </a:bodyPr>
               <a:lstStyle/>
               <a:p>
+                <a:pPr/>
                 <a14:m>
                   <m:oMathPara xmlns:m="http://schemas.openxmlformats.org/officeDocument/2006/math">
                     <m:oMathParaPr>
@@ -12503,7 +12486,7 @@
             </p:txBody>
           </p:sp>
         </mc:Choice>
-        <mc:Fallback>
+        <mc:Fallback xmlns="">
           <p:sp>
             <p:nvSpPr>
               <p:cNvPr id="13" name="TextBox 12">
@@ -12548,8 +12531,8 @@
           </p:sp>
         </mc:Fallback>
       </mc:AlternateContent>
-      <mc:AlternateContent xmlns:mc="http://schemas.openxmlformats.org/markup-compatibility/2006">
-        <mc:Choice xmlns:a14="http://schemas.microsoft.com/office/drawing/2010/main" Requires="a14">
+      <mc:AlternateContent xmlns:mc="http://schemas.openxmlformats.org/markup-compatibility/2006" xmlns:a14="http://schemas.microsoft.com/office/drawing/2010/main">
+        <mc:Choice Requires="a14">
           <p:sp>
             <p:nvSpPr>
               <p:cNvPr id="14" name="TextBox 13">
@@ -12578,6 +12561,7 @@
               </a:bodyPr>
               <a:lstStyle/>
               <a:p>
+                <a:pPr/>
                 <a14:m>
                   <m:oMathPara xmlns:m="http://schemas.openxmlformats.org/officeDocument/2006/math">
                     <m:oMathParaPr>
@@ -12598,7 +12582,7 @@
             </p:txBody>
           </p:sp>
         </mc:Choice>
-        <mc:Fallback>
+        <mc:Fallback xmlns="">
           <p:sp>
             <p:nvSpPr>
               <p:cNvPr id="14" name="TextBox 13">
@@ -12643,8 +12627,8 @@
           </p:sp>
         </mc:Fallback>
       </mc:AlternateContent>
-      <mc:AlternateContent xmlns:mc="http://schemas.openxmlformats.org/markup-compatibility/2006">
-        <mc:Choice xmlns:a14="http://schemas.microsoft.com/office/drawing/2010/main" Requires="a14">
+      <mc:AlternateContent xmlns:mc="http://schemas.openxmlformats.org/markup-compatibility/2006" xmlns:a14="http://schemas.microsoft.com/office/drawing/2010/main">
+        <mc:Choice Requires="a14">
           <p:sp>
             <p:nvSpPr>
               <p:cNvPr id="15" name="TextBox 14">
@@ -12673,6 +12657,7 @@
               </a:bodyPr>
               <a:lstStyle/>
               <a:p>
+                <a:pPr/>
                 <a14:m>
                   <m:oMathPara xmlns:m="http://schemas.openxmlformats.org/officeDocument/2006/math">
                     <m:oMathParaPr>
@@ -12693,7 +12678,7 @@
             </p:txBody>
           </p:sp>
         </mc:Choice>
-        <mc:Fallback>
+        <mc:Fallback xmlns="">
           <p:sp>
             <p:nvSpPr>
               <p:cNvPr id="15" name="TextBox 14">
@@ -12796,8 +12781,8 @@
           </a:p>
         </p:txBody>
       </p:sp>
-      <mc:AlternateContent xmlns:mc="http://schemas.openxmlformats.org/markup-compatibility/2006">
-        <mc:Choice xmlns:a14="http://schemas.microsoft.com/office/drawing/2010/main" Requires="a14">
+      <mc:AlternateContent xmlns:mc="http://schemas.openxmlformats.org/markup-compatibility/2006" xmlns:a14="http://schemas.microsoft.com/office/drawing/2010/main">
+        <mc:Choice Requires="a14">
           <p:sp>
             <p:nvSpPr>
               <p:cNvPr id="3" name="Content Placeholder 2">
@@ -13333,7 +13318,7 @@
             </p:txBody>
           </p:sp>
         </mc:Choice>
-        <mc:Fallback>
+        <mc:Fallback xmlns="">
           <p:sp>
             <p:nvSpPr>
               <p:cNvPr id="3" name="Content Placeholder 2">
@@ -13647,8 +13632,8 @@
           </a:fontRef>
         </p:style>
       </p:cxnSp>
-      <mc:AlternateContent xmlns:mc="http://schemas.openxmlformats.org/markup-compatibility/2006">
-        <mc:Choice xmlns:a14="http://schemas.microsoft.com/office/drawing/2010/main" Requires="a14">
+      <mc:AlternateContent xmlns:mc="http://schemas.openxmlformats.org/markup-compatibility/2006" xmlns:a14="http://schemas.microsoft.com/office/drawing/2010/main">
+        <mc:Choice Requires="a14">
           <p:sp>
             <p:nvSpPr>
               <p:cNvPr id="10" name="TextBox 9">
@@ -13677,6 +13662,7 @@
               </a:bodyPr>
               <a:lstStyle/>
               <a:p>
+                <a:pPr/>
                 <a14:m>
                   <m:oMathPara xmlns:m="http://schemas.openxmlformats.org/officeDocument/2006/math">
                     <m:oMathParaPr>
@@ -13716,7 +13702,7 @@
             </p:txBody>
           </p:sp>
         </mc:Choice>
-        <mc:Fallback>
+        <mc:Fallback xmlns="">
           <p:sp>
             <p:nvSpPr>
               <p:cNvPr id="10" name="TextBox 9">
@@ -13761,8 +13747,8 @@
           </p:sp>
         </mc:Fallback>
       </mc:AlternateContent>
-      <mc:AlternateContent xmlns:mc="http://schemas.openxmlformats.org/markup-compatibility/2006">
-        <mc:Choice xmlns:a14="http://schemas.microsoft.com/office/drawing/2010/main" Requires="a14">
+      <mc:AlternateContent xmlns:mc="http://schemas.openxmlformats.org/markup-compatibility/2006" xmlns:a14="http://schemas.microsoft.com/office/drawing/2010/main">
+        <mc:Choice Requires="a14">
           <p:sp>
             <p:nvSpPr>
               <p:cNvPr id="11" name="TextBox 10">
@@ -13791,6 +13777,7 @@
               </a:bodyPr>
               <a:lstStyle/>
               <a:p>
+                <a:pPr/>
                 <a14:m>
                   <m:oMathPara xmlns:m="http://schemas.openxmlformats.org/officeDocument/2006/math">
                     <m:oMathParaPr>
@@ -13830,7 +13817,7 @@
             </p:txBody>
           </p:sp>
         </mc:Choice>
-        <mc:Fallback>
+        <mc:Fallback xmlns="">
           <p:sp>
             <p:nvSpPr>
               <p:cNvPr id="11" name="TextBox 10">
@@ -13875,8 +13862,8 @@
           </p:sp>
         </mc:Fallback>
       </mc:AlternateContent>
-      <mc:AlternateContent xmlns:mc="http://schemas.openxmlformats.org/markup-compatibility/2006">
-        <mc:Choice xmlns:a14="http://schemas.microsoft.com/office/drawing/2010/main" Requires="a14">
+      <mc:AlternateContent xmlns:mc="http://schemas.openxmlformats.org/markup-compatibility/2006" xmlns:a14="http://schemas.microsoft.com/office/drawing/2010/main">
+        <mc:Choice Requires="a14">
           <p:sp>
             <p:nvSpPr>
               <p:cNvPr id="12" name="TextBox 11">
@@ -13905,6 +13892,7 @@
               </a:bodyPr>
               <a:lstStyle/>
               <a:p>
+                <a:pPr/>
                 <a14:m>
                   <m:oMathPara xmlns:m="http://schemas.openxmlformats.org/officeDocument/2006/math">
                     <m:oMathParaPr>
@@ -13925,7 +13913,7 @@
             </p:txBody>
           </p:sp>
         </mc:Choice>
-        <mc:Fallback>
+        <mc:Fallback xmlns="">
           <p:sp>
             <p:nvSpPr>
               <p:cNvPr id="12" name="TextBox 11">
@@ -14022,8 +14010,8 @@
           </a:p>
         </p:txBody>
       </p:sp>
-      <mc:AlternateContent xmlns:mc="http://schemas.openxmlformats.org/markup-compatibility/2006">
-        <mc:Choice xmlns:a14="http://schemas.microsoft.com/office/drawing/2010/main" Requires="a14">
+      <mc:AlternateContent xmlns:mc="http://schemas.openxmlformats.org/markup-compatibility/2006" xmlns:a14="http://schemas.microsoft.com/office/drawing/2010/main">
+        <mc:Choice Requires="a14">
           <p:sp>
             <p:nvSpPr>
               <p:cNvPr id="14" name="TextBox 13">
@@ -14052,6 +14040,7 @@
               </a:bodyPr>
               <a:lstStyle/>
               <a:p>
+                <a:pPr/>
                 <a14:m>
                   <m:oMathPara xmlns:m="http://schemas.openxmlformats.org/officeDocument/2006/math">
                     <m:oMathParaPr>
@@ -14091,7 +14080,7 @@
             </p:txBody>
           </p:sp>
         </mc:Choice>
-        <mc:Fallback>
+        <mc:Fallback xmlns="">
           <p:sp>
             <p:nvSpPr>
               <p:cNvPr id="14" name="TextBox 13">
@@ -14292,8 +14281,8 @@
           </a:p>
         </p:txBody>
       </p:sp>
-      <mc:AlternateContent xmlns:mc="http://schemas.openxmlformats.org/markup-compatibility/2006">
-        <mc:Choice xmlns:a14="http://schemas.microsoft.com/office/drawing/2010/main" Requires="a14">
+      <mc:AlternateContent xmlns:mc="http://schemas.openxmlformats.org/markup-compatibility/2006" xmlns:a14="http://schemas.microsoft.com/office/drawing/2010/main">
+        <mc:Choice Requires="a14">
           <p:sp>
             <p:nvSpPr>
               <p:cNvPr id="22" name="TextBox 21">
@@ -14322,6 +14311,7 @@
               </a:bodyPr>
               <a:lstStyle/>
               <a:p>
+                <a:pPr/>
                 <a14:m>
                   <m:oMathPara xmlns:m="http://schemas.openxmlformats.org/officeDocument/2006/math">
                     <m:oMathParaPr>
@@ -14361,7 +14351,7 @@
             </p:txBody>
           </p:sp>
         </mc:Choice>
-        <mc:Fallback>
+        <mc:Fallback xmlns="">
           <p:sp>
             <p:nvSpPr>
               <p:cNvPr id="22" name="TextBox 21">
@@ -14737,8 +14727,8 @@
           </a:fontRef>
         </p:style>
       </p:cxnSp>
-      <mc:AlternateContent xmlns:mc="http://schemas.openxmlformats.org/markup-compatibility/2006">
-        <mc:Choice xmlns:a14="http://schemas.microsoft.com/office/drawing/2010/main" Requires="a14">
+      <mc:AlternateContent xmlns:mc="http://schemas.openxmlformats.org/markup-compatibility/2006" xmlns:a14="http://schemas.microsoft.com/office/drawing/2010/main">
+        <mc:Choice Requires="a14">
           <p:sp>
             <p:nvSpPr>
               <p:cNvPr id="40" name="TextBox 39">
@@ -14767,6 +14757,7 @@
               </a:bodyPr>
               <a:lstStyle/>
               <a:p>
+                <a:pPr/>
                 <a14:m>
                   <m:oMathPara xmlns:m="http://schemas.openxmlformats.org/officeDocument/2006/math">
                     <m:oMathParaPr>
@@ -14787,7 +14778,7 @@
             </p:txBody>
           </p:sp>
         </mc:Choice>
-        <mc:Fallback>
+        <mc:Fallback xmlns="">
           <p:sp>
             <p:nvSpPr>
               <p:cNvPr id="40" name="TextBox 39">
@@ -14832,8 +14823,8 @@
           </p:sp>
         </mc:Fallback>
       </mc:AlternateContent>
-      <mc:AlternateContent xmlns:mc="http://schemas.openxmlformats.org/markup-compatibility/2006">
-        <mc:Choice xmlns:a14="http://schemas.microsoft.com/office/drawing/2010/main" Requires="a14">
+      <mc:AlternateContent xmlns:mc="http://schemas.openxmlformats.org/markup-compatibility/2006" xmlns:a14="http://schemas.microsoft.com/office/drawing/2010/main">
+        <mc:Choice Requires="a14">
           <p:sp>
             <p:nvSpPr>
               <p:cNvPr id="41" name="TextBox 40">
@@ -14862,6 +14853,7 @@
               </a:bodyPr>
               <a:lstStyle/>
               <a:p>
+                <a:pPr/>
                 <a14:m>
                   <m:oMathPara xmlns:m="http://schemas.openxmlformats.org/officeDocument/2006/math">
                     <m:oMathParaPr>
@@ -14882,7 +14874,7 @@
             </p:txBody>
           </p:sp>
         </mc:Choice>
-        <mc:Fallback>
+        <mc:Fallback xmlns="">
           <p:sp>
             <p:nvSpPr>
               <p:cNvPr id="41" name="TextBox 40">
@@ -14985,8 +14977,8 @@
           </a:p>
         </p:txBody>
       </p:sp>
-      <mc:AlternateContent xmlns:mc="http://schemas.openxmlformats.org/markup-compatibility/2006">
-        <mc:Choice xmlns:a14="http://schemas.microsoft.com/office/drawing/2010/main" Requires="a14">
+      <mc:AlternateContent xmlns:mc="http://schemas.openxmlformats.org/markup-compatibility/2006" xmlns:a14="http://schemas.microsoft.com/office/drawing/2010/main">
+        <mc:Choice Requires="a14">
           <p:sp>
             <p:nvSpPr>
               <p:cNvPr id="3" name="Content Placeholder 2">
@@ -16908,7 +16900,7 @@
             </p:txBody>
           </p:sp>
         </mc:Choice>
-        <mc:Fallback>
+        <mc:Fallback xmlns="">
           <p:sp>
             <p:nvSpPr>
               <p:cNvPr id="3" name="Content Placeholder 2">
@@ -29212,13 +29204,7 @@
                                   <a:rPr lang="en-US" b="0" i="1" smtClean="0">
                                     <a:latin typeface="Cambria Math" panose="02040503050406030204" pitchFamily="18" charset="0"/>
                                   </a:rPr>
-                                  <m:t>1</m:t>
-                                </m:r>
-                                <m:r>
-                                  <a:rPr lang="en-US" b="0" i="1" smtClean="0">
-                                    <a:latin typeface="Cambria Math" panose="02040503050406030204" pitchFamily="18" charset="0"/>
-                                  </a:rPr>
-                                  <m:t>+</m:t>
+                                  <m:t>1+</m:t>
                                 </m:r>
                                 <m:sSup>
                                   <m:sSupPr>
@@ -29334,13 +29320,7 @@
                           <a:rPr lang="en-US" i="1">
                             <a:latin typeface="Cambria Math" panose="02040503050406030204" pitchFamily="18" charset="0"/>
                           </a:rPr>
-                          <m:t>1</m:t>
-                        </m:r>
-                        <m:r>
-                          <a:rPr lang="en-US" i="1">
-                            <a:latin typeface="Cambria Math" panose="02040503050406030204" pitchFamily="18" charset="0"/>
-                          </a:rPr>
-                          <m:t>:</m:t>
+                          <m:t>1:</m:t>
                         </m:r>
                         <m:r>
                           <a:rPr lang="en-US" i="1">
@@ -29943,13 +29923,7 @@
                           <a:rPr lang="en-US" b="0" i="1" smtClean="0">
                             <a:latin typeface="Cambria Math" panose="02040503050406030204" pitchFamily="18" charset="0"/>
                           </a:rPr>
-                          <m:t>=</m:t>
-                        </m:r>
-                        <m:r>
-                          <a:rPr lang="en-US" b="0" i="1" smtClean="0">
-                            <a:latin typeface="Cambria Math" panose="02040503050406030204" pitchFamily="18" charset="0"/>
-                          </a:rPr>
-                          <m:t>1</m:t>
+                          <m:t>=1</m:t>
                         </m:r>
                       </m:sub>
                       <m:sup>
@@ -30194,13 +30168,7 @@
                               <a:rPr lang="en-US" i="1">
                                 <a:latin typeface="Cambria Math" panose="02040503050406030204" pitchFamily="18" charset="0"/>
                               </a:rPr>
-                              <m:t>1</m:t>
-                            </m:r>
-                            <m:r>
-                              <a:rPr lang="en-US" i="1">
-                                <a:latin typeface="Cambria Math" panose="02040503050406030204" pitchFamily="18" charset="0"/>
-                              </a:rPr>
-                              <m:t>+</m:t>
+                              <m:t>1+</m:t>
                             </m:r>
                             <m:sSup>
                               <m:sSupPr>
@@ -41502,31 +41470,7 @@
                       <a:rPr lang="en-US" b="0" i="1" smtClean="0">
                         <a:latin typeface="Cambria Math" panose="02040503050406030204" pitchFamily="18" charset="0"/>
                       </a:rPr>
-                      <m:t>∈[</m:t>
-                    </m:r>
-                    <m:r>
-                      <a:rPr lang="en-US" b="0" i="1" smtClean="0">
-                        <a:latin typeface="Cambria Math" panose="02040503050406030204" pitchFamily="18" charset="0"/>
-                      </a:rPr>
-                      <m:t>0</m:t>
-                    </m:r>
-                    <m:r>
-                      <a:rPr lang="en-US" b="0" i="1" smtClean="0">
-                        <a:latin typeface="Cambria Math" panose="02040503050406030204" pitchFamily="18" charset="0"/>
-                      </a:rPr>
-                      <m:t>,</m:t>
-                    </m:r>
-                    <m:r>
-                      <a:rPr lang="en-US" b="0" i="1" smtClean="0">
-                        <a:latin typeface="Cambria Math" panose="02040503050406030204" pitchFamily="18" charset="0"/>
-                      </a:rPr>
-                      <m:t>1</m:t>
-                    </m:r>
-                    <m:r>
-                      <a:rPr lang="en-US" b="0" i="1" smtClean="0">
-                        <a:latin typeface="Cambria Math" panose="02040503050406030204" pitchFamily="18" charset="0"/>
-                      </a:rPr>
-                      <m:t>]</m:t>
+                      <m:t>∈[0,1]</m:t>
                     </m:r>
                   </m:oMath>
                 </a14:m>
@@ -41583,13 +41527,7 @@
                               <a:rPr lang="en-US" b="0" i="1" smtClean="0">
                                 <a:latin typeface="Cambria Math" panose="02040503050406030204" pitchFamily="18" charset="0"/>
                               </a:rPr>
-                              <m:t>1</m:t>
-                            </m:r>
-                            <m:r>
-                              <a:rPr lang="en-US" b="0" i="1" smtClean="0">
-                                <a:latin typeface="Cambria Math" panose="02040503050406030204" pitchFamily="18" charset="0"/>
-                              </a:rPr>
-                              <m:t>−</m:t>
+                              <m:t>1−</m:t>
                             </m:r>
                             <m:r>
                               <a:rPr lang="en-US" b="0" i="1" smtClean="0">
@@ -41655,13 +41593,7 @@
                           <a:rPr lang="en-US" b="0" i="1" smtClean="0">
                             <a:latin typeface="Cambria Math" panose="02040503050406030204" pitchFamily="18" charset="0"/>
                           </a:rPr>
-                          <m:t>1</m:t>
-                        </m:r>
-                        <m:r>
-                          <a:rPr lang="en-US" b="0" i="1" smtClean="0">
-                            <a:latin typeface="Cambria Math" panose="02040503050406030204" pitchFamily="18" charset="0"/>
-                          </a:rPr>
-                          <m:t>−</m:t>
+                          <m:t>1−</m:t>
                         </m:r>
                         <m:r>
                           <a:rPr lang="en-US" b="0" i="1" smtClean="0">

</xml_diff>